<commit_message>
Added Comments and replaced report files
</commit_message>
<xml_diff>
--- a/ADS1 Assignement3 22074395 [Autosaved].pptx
+++ b/ADS1 Assignement3 22074395 [Autosaved].pptx
@@ -4312,7 +4312,7 @@
               <a:t>difference</a:t>
             </a:r>
             <a:r>
-              <a:rPr lang="fr-FR" sz="2200"/>
+              <a:rPr lang="fr-FR" sz="2200" dirty="0"/>
               <a:t>.</a:t>
             </a:r>
             <a:endParaRPr lang="fr-FR" sz="2200" b="1" u="sng" dirty="0"/>
@@ -4696,7 +4696,23 @@
             </a:r>
             <a:r>
               <a:rPr lang="fr-FR" sz="2200" dirty="0" err="1"/>
-              <a:t>say</a:t>
+              <a:t>guess</a:t>
+            </a:r>
+            <a:r>
+              <a:rPr lang="fr-FR" sz="2200" dirty="0"/>
+              <a:t> the </a:t>
+            </a:r>
+            <a:r>
+              <a:rPr lang="fr-FR" sz="2200" dirty="0" err="1"/>
+              <a:t>demand</a:t>
+            </a:r>
+            <a:r>
+              <a:rPr lang="fr-FR" sz="2200" dirty="0"/>
+              <a:t> for non-</a:t>
+            </a:r>
+            <a:r>
+              <a:rPr lang="fr-FR" sz="2200" dirty="0" err="1"/>
+              <a:t>renewable</a:t>
             </a:r>
             <a:r>
               <a:rPr lang="fr-FR" sz="2200" dirty="0"/>
@@ -4704,7 +4720,15 @@
             </a:r>
             <a:r>
               <a:rPr lang="fr-FR" sz="2200" dirty="0" err="1"/>
-              <a:t>that</a:t>
+              <a:t>solid</a:t>
+            </a:r>
+            <a:r>
+              <a:rPr lang="fr-FR" sz="2200" dirty="0"/>
+              <a:t> fuels. But more </a:t>
+            </a:r>
+            <a:r>
+              <a:rPr lang="fr-FR" sz="2200" dirty="0" err="1"/>
+              <a:t>indicators</a:t>
             </a:r>
             <a:r>
               <a:rPr lang="fr-FR" sz="2200" dirty="0"/>
@@ -4712,7 +4736,15 @@
             </a:r>
             <a:r>
               <a:rPr lang="fr-FR" sz="2200" dirty="0" err="1"/>
-              <a:t>it</a:t>
+              <a:t>need</a:t>
+            </a:r>
+            <a:r>
+              <a:rPr lang="fr-FR" sz="2200" dirty="0"/>
+              <a:t> to </a:t>
+            </a:r>
+            <a:r>
+              <a:rPr lang="fr-FR" sz="2200" dirty="0" err="1"/>
+              <a:t>be</a:t>
             </a:r>
             <a:r>
               <a:rPr lang="fr-FR" sz="2200" dirty="0"/>
@@ -4720,7 +4752,7 @@
             </a:r>
             <a:r>
               <a:rPr lang="fr-FR" sz="2200" dirty="0" err="1"/>
-              <a:t>will</a:t>
+              <a:t>considered</a:t>
             </a:r>
             <a:r>
               <a:rPr lang="fr-FR" sz="2200" dirty="0"/>
@@ -4728,23 +4760,7 @@
             </a:r>
             <a:r>
               <a:rPr lang="fr-FR" sz="2200" dirty="0" err="1"/>
-              <a:t>reduce</a:t>
-            </a:r>
-            <a:r>
-              <a:rPr lang="fr-FR" sz="2200" dirty="0"/>
-              <a:t> the </a:t>
-            </a:r>
-            <a:r>
-              <a:rPr lang="fr-FR" sz="2200" dirty="0" err="1"/>
-              <a:t>demand</a:t>
-            </a:r>
-            <a:r>
-              <a:rPr lang="fr-FR" sz="2200" dirty="0"/>
-              <a:t> for non-</a:t>
-            </a:r>
-            <a:r>
-              <a:rPr lang="fr-FR" sz="2200" dirty="0" err="1"/>
-              <a:t>renewable</a:t>
+              <a:t>before</a:t>
             </a:r>
             <a:r>
               <a:rPr lang="fr-FR" sz="2200" dirty="0"/>
@@ -4752,11 +4768,19 @@
             </a:r>
             <a:r>
               <a:rPr lang="fr-FR" sz="2200" dirty="0" err="1"/>
-              <a:t>solid</a:t>
-            </a:r>
-            <a:r>
-              <a:rPr lang="fr-FR" sz="2200" dirty="0"/>
-              <a:t> fuels.</a:t>
+              <a:t>taking</a:t>
+            </a:r>
+            <a:r>
+              <a:rPr lang="fr-FR" sz="2200" dirty="0"/>
+              <a:t> a </a:t>
+            </a:r>
+            <a:r>
+              <a:rPr lang="fr-FR" sz="2200" dirty="0" err="1"/>
+              <a:t>decision</a:t>
+            </a:r>
+            <a:r>
+              <a:rPr lang="fr-FR" sz="2200" dirty="0"/>
+              <a:t>.</a:t>
             </a:r>
           </a:p>
         </p:txBody>

</xml_diff>